<commit_message>
Updated slides for DDD basics
</commit_message>
<xml_diff>
--- a/slides/presentation.pptx
+++ b/slides/presentation.pptx
@@ -24,6 +24,7 @@
     <p:sldId id="269" r:id="rId21"/>
     <p:sldId id="270" r:id="rId22"/>
     <p:sldId id="271" r:id="rId23"/>
+    <p:sldId id="272" r:id="rId24"/>
   </p:sldIdLst>
   <p:sldSz cx="13004800" cy="9753600"/>
   <p:notesSz cx="6858000" cy="9144000"/>
@@ -952,6 +953,85 @@
             <a:pPr/>
             <a:r>
               <a:t>So let's take a look at ASPNET Cores conventional routing approach to building the routes for our API.</a:t>
+            </a:r>
+          </a:p>
+        </p:txBody>
+      </p:sp>
+    </p:spTree>
+  </p:cSld>
+  <p:clrMapOvr>
+    <a:masterClrMapping/>
+  </p:clrMapOvr>
+</p:notes>
+</file>
+
+<file path=ppt/notesSlides/notesSlide6.xml><?xml version="1.0" encoding="utf-8"?>
+<p:notes xmlns:a="http://schemas.openxmlformats.org/drawingml/2006/main" xmlns:r="http://schemas.openxmlformats.org/officeDocument/2006/relationships" xmlns:p="http://schemas.openxmlformats.org/presentationml/2006/main" showMasterSp="1" showMasterPhAnim="1">
+  <p:cSld>
+    <p:spTree>
+      <p:nvGrpSpPr>
+        <p:cNvPr id="1" name=""/>
+        <p:cNvGrpSpPr/>
+        <p:nvPr/>
+      </p:nvGrpSpPr>
+      <p:grpSpPr>
+        <a:xfrm>
+          <a:off x="0" y="0"/>
+          <a:ext cx="0" cy="0"/>
+          <a:chOff x="0" y="0"/>
+          <a:chExt cx="0" cy="0"/>
+        </a:xfrm>
+      </p:grpSpPr>
+      <p:sp>
+        <p:nvSpPr>
+          <p:cNvPr id="217" name="Shape 217"/>
+          <p:cNvSpPr/>
+          <p:nvPr>
+            <p:ph type="sldImg"/>
+          </p:nvPr>
+        </p:nvSpPr>
+        <p:spPr>
+          <a:prstGeom prst="rect">
+            <a:avLst/>
+          </a:prstGeom>
+        </p:spPr>
+        <p:txBody>
+          <a:bodyPr/>
+          <a:lstStyle/>
+          <a:p>
+            <a:pPr/>
+          </a:p>
+        </p:txBody>
+      </p:sp>
+      <p:sp>
+        <p:nvSpPr>
+          <p:cNvPr id="218" name="Shape 218"/>
+          <p:cNvSpPr/>
+          <p:nvPr>
+            <p:ph type="body" sz="quarter" idx="1"/>
+          </p:nvPr>
+        </p:nvSpPr>
+        <p:spPr>
+          <a:prstGeom prst="rect">
+            <a:avLst/>
+          </a:prstGeom>
+        </p:spPr>
+        <p:txBody>
+          <a:bodyPr/>
+          <a:lstStyle/>
+          <a:p>
+            <a:pPr/>
+            <a:r>
+              <a:t>Fuzzy United (or FUN for short) is a boarding kennel in need of an API.</a:t>
+            </a:r>
+          </a:p>
+          <a:p>
+            <a:pPr/>
+          </a:p>
+          <a:p>
+            <a:pPr/>
+            <a:r>
+              <a:t>To keep things simple, we’ll tackle 3 entities: Customers, Pets &amp; Bookings</a:t>
             </a:r>
           </a:p>
         </p:txBody>
@@ -4977,6 +5057,2407 @@
 </p:sld>
 </file>
 
+<file path=ppt/slides/slide17.xml><?xml version="1.0" encoding="utf-8"?>
+<p:sld xmlns:a="http://schemas.openxmlformats.org/drawingml/2006/main" xmlns:r="http://schemas.openxmlformats.org/officeDocument/2006/relationships" xmlns:p="http://schemas.openxmlformats.org/presentationml/2006/main" showMasterSp="1" showMasterPhAnim="1">
+  <p:cSld>
+    <p:spTree>
+      <p:nvGrpSpPr>
+        <p:cNvPr id="1" name=""/>
+        <p:cNvGrpSpPr/>
+        <p:nvPr/>
+      </p:nvGrpSpPr>
+      <p:grpSpPr>
+        <a:xfrm>
+          <a:off x="0" y="0"/>
+          <a:ext cx="0" cy="0"/>
+          <a:chOff x="0" y="0"/>
+          <a:chExt cx="0" cy="0"/>
+        </a:xfrm>
+      </p:grpSpPr>
+      <p:sp>
+        <p:nvSpPr>
+          <p:cNvPr id="213" name="Fuzzy UNITED BOARDING KENNELS"/>
+          <p:cNvSpPr txBox="1"/>
+          <p:nvPr>
+            <p:ph type="title"/>
+          </p:nvPr>
+        </p:nvSpPr>
+        <p:spPr>
+          <a:xfrm>
+            <a:off x="660400" y="-78480"/>
+            <a:ext cx="11684000" cy="2222501"/>
+          </a:xfrm>
+          <a:prstGeom prst="rect">
+            <a:avLst/>
+          </a:prstGeom>
+        </p:spPr>
+        <p:txBody>
+          <a:bodyPr/>
+          <a:lstStyle>
+            <a:lvl1pPr>
+              <a:defRPr spc="672" sz="4200"/>
+            </a:lvl1pPr>
+          </a:lstStyle>
+          <a:p>
+            <a:pPr/>
+            <a:r>
+              <a:t>Fuzzy UNITED BOARDING KENNELS</a:t>
+            </a:r>
+          </a:p>
+        </p:txBody>
+      </p:sp>
+      <p:sp>
+        <p:nvSpPr>
+          <p:cNvPr id="214" name="Pets"/>
+          <p:cNvSpPr/>
+          <p:nvPr/>
+        </p:nvSpPr>
+        <p:spPr>
+          <a:xfrm>
+            <a:off x="1580824" y="2470645"/>
+            <a:ext cx="2292843" cy="2698623"/>
+          </a:xfrm>
+          <a:custGeom>
+            <a:avLst/>
+            <a:gdLst/>
+            <a:ahLst/>
+            <a:cxnLst>
+              <a:cxn ang="0">
+                <a:pos x="wd2" y="hd2"/>
+              </a:cxn>
+              <a:cxn ang="5400000">
+                <a:pos x="wd2" y="hd2"/>
+              </a:cxn>
+              <a:cxn ang="10800000">
+                <a:pos x="wd2" y="hd2"/>
+              </a:cxn>
+              <a:cxn ang="16200000">
+                <a:pos x="wd2" y="hd2"/>
+              </a:cxn>
+            </a:cxnLst>
+            <a:rect l="0" t="0" r="r" b="b"/>
+            <a:pathLst>
+              <a:path w="21205" h="21591" fill="norm" stroke="1" extrusionOk="0">
+                <a:moveTo>
+                  <a:pt x="12155" y="0"/>
+                </a:moveTo>
+                <a:cubicBezTo>
+                  <a:pt x="12155" y="0"/>
+                  <a:pt x="11634" y="546"/>
+                  <a:pt x="11988" y="1070"/>
+                </a:cubicBezTo>
+                <a:cubicBezTo>
+                  <a:pt x="11988" y="1070"/>
+                  <a:pt x="12026" y="1808"/>
+                  <a:pt x="12529" y="2119"/>
+                </a:cubicBezTo>
+                <a:cubicBezTo>
+                  <a:pt x="12119" y="2596"/>
+                  <a:pt x="11896" y="3118"/>
+                  <a:pt x="11742" y="3566"/>
+                </a:cubicBezTo>
+                <a:cubicBezTo>
+                  <a:pt x="11598" y="3988"/>
+                  <a:pt x="11483" y="4582"/>
+                  <a:pt x="11381" y="4963"/>
+                </a:cubicBezTo>
+                <a:cubicBezTo>
+                  <a:pt x="11252" y="5449"/>
+                  <a:pt x="11380" y="5834"/>
+                  <a:pt x="10806" y="5983"/>
+                </a:cubicBezTo>
+                <a:cubicBezTo>
+                  <a:pt x="6995" y="6974"/>
+                  <a:pt x="4684" y="10520"/>
+                  <a:pt x="4084" y="13437"/>
+                </a:cubicBezTo>
+                <a:cubicBezTo>
+                  <a:pt x="4084" y="13437"/>
+                  <a:pt x="1380" y="15573"/>
+                  <a:pt x="11" y="20975"/>
+                </a:cubicBezTo>
+                <a:cubicBezTo>
+                  <a:pt x="-147" y="21600"/>
+                  <a:pt x="1388" y="20964"/>
+                  <a:pt x="1388" y="20964"/>
+                </a:cubicBezTo>
+                <a:cubicBezTo>
+                  <a:pt x="1388" y="20964"/>
+                  <a:pt x="1381" y="21330"/>
+                  <a:pt x="2515" y="21318"/>
+                </a:cubicBezTo>
+                <a:cubicBezTo>
+                  <a:pt x="3117" y="21318"/>
+                  <a:pt x="5098" y="21049"/>
+                  <a:pt x="6621" y="20454"/>
+                </a:cubicBezTo>
+                <a:cubicBezTo>
+                  <a:pt x="8164" y="19850"/>
+                  <a:pt x="8734" y="19355"/>
+                  <a:pt x="8917" y="19012"/>
+                </a:cubicBezTo>
+                <a:cubicBezTo>
+                  <a:pt x="9492" y="19367"/>
+                  <a:pt x="10184" y="19586"/>
+                  <a:pt x="10401" y="19750"/>
+                </a:cubicBezTo>
+                <a:cubicBezTo>
+                  <a:pt x="10661" y="19946"/>
+                  <a:pt x="10776" y="20299"/>
+                  <a:pt x="10236" y="20426"/>
+                </a:cubicBezTo>
+                <a:cubicBezTo>
+                  <a:pt x="9696" y="20554"/>
+                  <a:pt x="9601" y="20445"/>
+                  <a:pt x="9314" y="20576"/>
+                </a:cubicBezTo>
+                <a:cubicBezTo>
+                  <a:pt x="9241" y="20610"/>
+                  <a:pt x="9181" y="20645"/>
+                  <a:pt x="9132" y="20681"/>
+                </a:cubicBezTo>
+                <a:cubicBezTo>
+                  <a:pt x="8839" y="20611"/>
+                  <a:pt x="8370" y="20618"/>
+                  <a:pt x="8039" y="21193"/>
+                </a:cubicBezTo>
+                <a:cubicBezTo>
+                  <a:pt x="8012" y="21242"/>
+                  <a:pt x="8079" y="21288"/>
+                  <a:pt x="8127" y="21253"/>
+                </a:cubicBezTo>
+                <a:cubicBezTo>
+                  <a:pt x="8352" y="21088"/>
+                  <a:pt x="8727" y="20902"/>
+                  <a:pt x="9057" y="21177"/>
+                </a:cubicBezTo>
+                <a:cubicBezTo>
+                  <a:pt x="9060" y="21180"/>
+                  <a:pt x="9063" y="21182"/>
+                  <a:pt x="9066" y="21184"/>
+                </a:cubicBezTo>
+                <a:cubicBezTo>
+                  <a:pt x="9177" y="21293"/>
+                  <a:pt x="9361" y="21367"/>
+                  <a:pt x="9558" y="21367"/>
+                </a:cubicBezTo>
+                <a:cubicBezTo>
+                  <a:pt x="10402" y="21367"/>
+                  <a:pt x="10993" y="21022"/>
+                  <a:pt x="11484" y="21087"/>
+                </a:cubicBezTo>
+                <a:cubicBezTo>
+                  <a:pt x="11975" y="21152"/>
+                  <a:pt x="12378" y="21591"/>
+                  <a:pt x="13299" y="21591"/>
+                </a:cubicBezTo>
+                <a:cubicBezTo>
+                  <a:pt x="13972" y="21591"/>
+                  <a:pt x="14295" y="21117"/>
+                  <a:pt x="14786" y="21367"/>
+                </a:cubicBezTo>
+                <a:cubicBezTo>
+                  <a:pt x="15156" y="21555"/>
+                  <a:pt x="15820" y="21465"/>
+                  <a:pt x="16107" y="21286"/>
+                </a:cubicBezTo>
+                <a:cubicBezTo>
+                  <a:pt x="16274" y="21191"/>
+                  <a:pt x="16396" y="21051"/>
+                  <a:pt x="16787" y="21087"/>
+                </a:cubicBezTo>
+                <a:cubicBezTo>
+                  <a:pt x="17474" y="21150"/>
+                  <a:pt x="17609" y="21380"/>
+                  <a:pt x="18345" y="21338"/>
+                </a:cubicBezTo>
+                <a:cubicBezTo>
+                  <a:pt x="18669" y="21319"/>
+                  <a:pt x="18914" y="21228"/>
+                  <a:pt x="19065" y="21109"/>
+                </a:cubicBezTo>
+                <a:cubicBezTo>
+                  <a:pt x="19250" y="21149"/>
+                  <a:pt x="19385" y="21231"/>
+                  <a:pt x="19472" y="21302"/>
+                </a:cubicBezTo>
+                <a:cubicBezTo>
+                  <a:pt x="19519" y="21340"/>
+                  <a:pt x="19598" y="21305"/>
+                  <a:pt x="19589" y="21249"/>
+                </a:cubicBezTo>
+                <a:cubicBezTo>
+                  <a:pt x="19558" y="21071"/>
+                  <a:pt x="19460" y="20958"/>
+                  <a:pt x="19334" y="20888"/>
+                </a:cubicBezTo>
+                <a:cubicBezTo>
+                  <a:pt x="19666" y="20802"/>
+                  <a:pt x="20061" y="20835"/>
+                  <a:pt x="20331" y="21302"/>
+                </a:cubicBezTo>
+                <a:cubicBezTo>
+                  <a:pt x="20349" y="21332"/>
+                  <a:pt x="20401" y="21318"/>
+                  <a:pt x="20396" y="21284"/>
+                </a:cubicBezTo>
+                <a:cubicBezTo>
+                  <a:pt x="20331" y="20887"/>
+                  <a:pt x="20062" y="20051"/>
+                  <a:pt x="18961" y="20452"/>
+                </a:cubicBezTo>
+                <a:cubicBezTo>
+                  <a:pt x="18626" y="20272"/>
+                  <a:pt x="18294" y="20475"/>
+                  <a:pt x="18086" y="20475"/>
+                </a:cubicBezTo>
+                <a:cubicBezTo>
+                  <a:pt x="17465" y="20475"/>
+                  <a:pt x="16944" y="19992"/>
+                  <a:pt x="16344" y="19665"/>
+                </a:cubicBezTo>
+                <a:cubicBezTo>
+                  <a:pt x="15687" y="19306"/>
+                  <a:pt x="15450" y="18064"/>
+                  <a:pt x="15366" y="17320"/>
+                </a:cubicBezTo>
+                <a:cubicBezTo>
+                  <a:pt x="15897" y="16942"/>
+                  <a:pt x="16449" y="16396"/>
+                  <a:pt x="16806" y="15687"/>
+                </a:cubicBezTo>
+                <a:cubicBezTo>
+                  <a:pt x="17916" y="13477"/>
+                  <a:pt x="19270" y="12913"/>
+                  <a:pt x="20417" y="11316"/>
+                </a:cubicBezTo>
+                <a:cubicBezTo>
+                  <a:pt x="21453" y="9872"/>
+                  <a:pt x="21337" y="8280"/>
+                  <a:pt x="20813" y="7091"/>
+                </a:cubicBezTo>
+                <a:cubicBezTo>
+                  <a:pt x="20720" y="6879"/>
+                  <a:pt x="20568" y="6592"/>
+                  <a:pt x="20653" y="6281"/>
+                </a:cubicBezTo>
+                <a:cubicBezTo>
+                  <a:pt x="21034" y="4883"/>
+                  <a:pt x="20741" y="2957"/>
+                  <a:pt x="20319" y="2189"/>
+                </a:cubicBezTo>
+                <a:cubicBezTo>
+                  <a:pt x="20830" y="1862"/>
+                  <a:pt x="20867" y="1110"/>
+                  <a:pt x="20867" y="1110"/>
+                </a:cubicBezTo>
+                <a:cubicBezTo>
+                  <a:pt x="21235" y="566"/>
+                  <a:pt x="20694" y="0"/>
+                  <a:pt x="20694" y="0"/>
+                </a:cubicBezTo>
+                <a:cubicBezTo>
+                  <a:pt x="20694" y="0"/>
+                  <a:pt x="20517" y="392"/>
+                  <a:pt x="19883" y="643"/>
+                </a:cubicBezTo>
+                <a:cubicBezTo>
+                  <a:pt x="19382" y="840"/>
+                  <a:pt x="18873" y="943"/>
+                  <a:pt x="18562" y="993"/>
+                </a:cubicBezTo>
+                <a:cubicBezTo>
+                  <a:pt x="18084" y="814"/>
+                  <a:pt x="17283" y="695"/>
+                  <a:pt x="16374" y="695"/>
+                </a:cubicBezTo>
+                <a:cubicBezTo>
+                  <a:pt x="15511" y="695"/>
+                  <a:pt x="14747" y="802"/>
+                  <a:pt x="14262" y="966"/>
+                </a:cubicBezTo>
+                <a:cubicBezTo>
+                  <a:pt x="13970" y="922"/>
+                  <a:pt x="13449" y="821"/>
+                  <a:pt x="12938" y="619"/>
+                </a:cubicBezTo>
+                <a:cubicBezTo>
+                  <a:pt x="12326" y="378"/>
+                  <a:pt x="12155" y="0"/>
+                  <a:pt x="12155" y="0"/>
+                </a:cubicBezTo>
+                <a:close/>
+                <a:moveTo>
+                  <a:pt x="14333" y="2907"/>
+                </a:moveTo>
+                <a:cubicBezTo>
+                  <a:pt x="14783" y="2983"/>
+                  <a:pt x="15167" y="3221"/>
+                  <a:pt x="15397" y="3548"/>
+                </a:cubicBezTo>
+                <a:cubicBezTo>
+                  <a:pt x="15356" y="3867"/>
+                  <a:pt x="15044" y="4115"/>
+                  <a:pt x="14665" y="4115"/>
+                </a:cubicBezTo>
+                <a:cubicBezTo>
+                  <a:pt x="14258" y="4115"/>
+                  <a:pt x="13929" y="3830"/>
+                  <a:pt x="13929" y="3478"/>
+                </a:cubicBezTo>
+                <a:cubicBezTo>
+                  <a:pt x="13929" y="3229"/>
+                  <a:pt x="14093" y="3012"/>
+                  <a:pt x="14333" y="2907"/>
+                </a:cubicBezTo>
+                <a:close/>
+                <a:moveTo>
+                  <a:pt x="18523" y="2907"/>
+                </a:moveTo>
+                <a:cubicBezTo>
+                  <a:pt x="18763" y="3012"/>
+                  <a:pt x="18927" y="3229"/>
+                  <a:pt x="18927" y="3478"/>
+                </a:cubicBezTo>
+                <a:cubicBezTo>
+                  <a:pt x="18927" y="3830"/>
+                  <a:pt x="18598" y="4115"/>
+                  <a:pt x="18191" y="4115"/>
+                </a:cubicBezTo>
+                <a:cubicBezTo>
+                  <a:pt x="17812" y="4115"/>
+                  <a:pt x="17499" y="3867"/>
+                  <a:pt x="17459" y="3548"/>
+                </a:cubicBezTo>
+                <a:cubicBezTo>
+                  <a:pt x="17689" y="3221"/>
+                  <a:pt x="18073" y="2983"/>
+                  <a:pt x="18523" y="2907"/>
+                </a:cubicBezTo>
+                <a:close/>
+                <a:moveTo>
+                  <a:pt x="14665" y="3144"/>
+                </a:moveTo>
+                <a:cubicBezTo>
+                  <a:pt x="14567" y="3144"/>
+                  <a:pt x="14469" y="3176"/>
+                  <a:pt x="14394" y="3241"/>
+                </a:cubicBezTo>
+                <a:cubicBezTo>
+                  <a:pt x="14244" y="3371"/>
+                  <a:pt x="14244" y="3583"/>
+                  <a:pt x="14394" y="3712"/>
+                </a:cubicBezTo>
+                <a:cubicBezTo>
+                  <a:pt x="14544" y="3842"/>
+                  <a:pt x="14786" y="3842"/>
+                  <a:pt x="14936" y="3712"/>
+                </a:cubicBezTo>
+                <a:cubicBezTo>
+                  <a:pt x="15086" y="3583"/>
+                  <a:pt x="15086" y="3371"/>
+                  <a:pt x="14936" y="3241"/>
+                </a:cubicBezTo>
+                <a:cubicBezTo>
+                  <a:pt x="14861" y="3176"/>
+                  <a:pt x="14763" y="3144"/>
+                  <a:pt x="14665" y="3144"/>
+                </a:cubicBezTo>
+                <a:close/>
+                <a:moveTo>
+                  <a:pt x="18191" y="3144"/>
+                </a:moveTo>
+                <a:cubicBezTo>
+                  <a:pt x="18092" y="3144"/>
+                  <a:pt x="17995" y="3176"/>
+                  <a:pt x="17920" y="3241"/>
+                </a:cubicBezTo>
+                <a:cubicBezTo>
+                  <a:pt x="17770" y="3371"/>
+                  <a:pt x="17770" y="3583"/>
+                  <a:pt x="17920" y="3712"/>
+                </a:cubicBezTo>
+                <a:cubicBezTo>
+                  <a:pt x="18070" y="3842"/>
+                  <a:pt x="18312" y="3842"/>
+                  <a:pt x="18462" y="3712"/>
+                </a:cubicBezTo>
+                <a:cubicBezTo>
+                  <a:pt x="18612" y="3583"/>
+                  <a:pt x="18612" y="3371"/>
+                  <a:pt x="18462" y="3241"/>
+                </a:cubicBezTo>
+                <a:cubicBezTo>
+                  <a:pt x="18387" y="3176"/>
+                  <a:pt x="18289" y="3144"/>
+                  <a:pt x="18191" y="3144"/>
+                </a:cubicBezTo>
+                <a:close/>
+                <a:moveTo>
+                  <a:pt x="12579" y="19082"/>
+                </a:moveTo>
+                <a:cubicBezTo>
+                  <a:pt x="12770" y="19225"/>
+                  <a:pt x="13015" y="19316"/>
+                  <a:pt x="13332" y="19345"/>
+                </a:cubicBezTo>
+                <a:cubicBezTo>
+                  <a:pt x="13862" y="19395"/>
+                  <a:pt x="14279" y="19924"/>
+                  <a:pt x="14206" y="20401"/>
+                </a:cubicBezTo>
+                <a:cubicBezTo>
+                  <a:pt x="13993" y="20496"/>
+                  <a:pt x="13793" y="20569"/>
+                  <a:pt x="13622" y="20569"/>
+                </a:cubicBezTo>
+                <a:cubicBezTo>
+                  <a:pt x="13074" y="20569"/>
+                  <a:pt x="12727" y="19967"/>
+                  <a:pt x="12579" y="19082"/>
+                </a:cubicBezTo>
+                <a:close/>
+              </a:path>
+            </a:pathLst>
+          </a:custGeom>
+          <a:solidFill>
+            <a:schemeClr val="accent1">
+              <a:hueOff val="450000"/>
+              <a:satOff val="-18071"/>
+              <a:lumOff val="-14609"/>
+            </a:schemeClr>
+          </a:solidFill>
+          <a:ln w="12700">
+            <a:miter lim="400000"/>
+          </a:ln>
+          <a:extLst>
+            <a:ext uri="{C572A759-6A51-4108-AA02-DFA0A04FC94B}">
+              <ma14:wrappingTextBoxFlag xmlns:ma14="http://schemas.microsoft.com/office/mac/drawingml/2011/main" val="1"/>
+            </a:ext>
+          </a:extLst>
+        </p:spPr>
+        <p:txBody>
+          <a:bodyPr lIns="50800" tIns="50800" rIns="50800" bIns="50800" anchor="ctr"/>
+          <a:lstStyle>
+            <a:lvl1pPr>
+              <a:defRPr cap="all" spc="384" sz="2400">
+                <a:latin typeface="Avenir Medium"/>
+                <a:ea typeface="Avenir Medium"/>
+                <a:cs typeface="Avenir Medium"/>
+                <a:sym typeface="Avenir Medium"/>
+              </a:defRPr>
+            </a:lvl1pPr>
+          </a:lstStyle>
+          <a:p>
+            <a:pPr/>
+            <a:r>
+              <a:t>Pets</a:t>
+            </a:r>
+          </a:p>
+        </p:txBody>
+      </p:sp>
+      <p:sp>
+        <p:nvSpPr>
+          <p:cNvPr id="215" name="customers"/>
+          <p:cNvSpPr/>
+          <p:nvPr/>
+        </p:nvSpPr>
+        <p:spPr>
+          <a:xfrm>
+            <a:off x="3928478" y="1608625"/>
+            <a:ext cx="8144866" cy="6892104"/>
+          </a:xfrm>
+          <a:custGeom>
+            <a:avLst/>
+            <a:gdLst/>
+            <a:ahLst/>
+            <a:cxnLst>
+              <a:cxn ang="0">
+                <a:pos x="wd2" y="hd2"/>
+              </a:cxn>
+              <a:cxn ang="5400000">
+                <a:pos x="wd2" y="hd2"/>
+              </a:cxn>
+              <a:cxn ang="10800000">
+                <a:pos x="wd2" y="hd2"/>
+              </a:cxn>
+              <a:cxn ang="16200000">
+                <a:pos x="wd2" y="hd2"/>
+              </a:cxn>
+            </a:cxnLst>
+            <a:rect l="0" t="0" r="r" b="b"/>
+            <a:pathLst>
+              <a:path w="21549" h="21600" fill="norm" stroke="1" extrusionOk="0">
+                <a:moveTo>
+                  <a:pt x="27" y="0"/>
+                </a:moveTo>
+                <a:cubicBezTo>
+                  <a:pt x="-2" y="0"/>
+                  <a:pt x="-9" y="21"/>
+                  <a:pt x="12" y="46"/>
+                </a:cubicBezTo>
+                <a:lnTo>
+                  <a:pt x="3476" y="4041"/>
+                </a:lnTo>
+                <a:cubicBezTo>
+                  <a:pt x="3497" y="4066"/>
+                  <a:pt x="3534" y="4067"/>
+                  <a:pt x="3557" y="4045"/>
+                </a:cubicBezTo>
+                <a:lnTo>
+                  <a:pt x="4804" y="2859"/>
+                </a:lnTo>
+                <a:cubicBezTo>
+                  <a:pt x="4828" y="2837"/>
+                  <a:pt x="4832" y="2797"/>
+                  <a:pt x="4816" y="2767"/>
+                </a:cubicBezTo>
+                <a:lnTo>
+                  <a:pt x="3338" y="54"/>
+                </a:lnTo>
+                <a:cubicBezTo>
+                  <a:pt x="3322" y="24"/>
+                  <a:pt x="3285" y="0"/>
+                  <a:pt x="3255" y="0"/>
+                </a:cubicBezTo>
+                <a:lnTo>
+                  <a:pt x="27" y="0"/>
+                </a:lnTo>
+                <a:close/>
+                <a:moveTo>
+                  <a:pt x="5664" y="3808"/>
+                </a:moveTo>
+                <a:cubicBezTo>
+                  <a:pt x="5426" y="3789"/>
+                  <a:pt x="5183" y="3851"/>
+                  <a:pt x="4961" y="4003"/>
+                </a:cubicBezTo>
+                <a:cubicBezTo>
+                  <a:pt x="4371" y="4410"/>
+                  <a:pt x="4169" y="5307"/>
+                  <a:pt x="4513" y="6006"/>
+                </a:cubicBezTo>
+                <a:lnTo>
+                  <a:pt x="8002" y="13112"/>
+                </a:lnTo>
+                <a:cubicBezTo>
+                  <a:pt x="8032" y="13174"/>
+                  <a:pt x="8065" y="13231"/>
+                  <a:pt x="8102" y="13286"/>
+                </a:cubicBezTo>
+                <a:cubicBezTo>
+                  <a:pt x="8406" y="13862"/>
+                  <a:pt x="9072" y="14692"/>
+                  <a:pt x="10477" y="15107"/>
+                </a:cubicBezTo>
+                <a:cubicBezTo>
+                  <a:pt x="10477" y="15107"/>
+                  <a:pt x="14595" y="16600"/>
+                  <a:pt x="16639" y="17139"/>
+                </a:cubicBezTo>
+                <a:lnTo>
+                  <a:pt x="19943" y="21267"/>
+                </a:lnTo>
+                <a:cubicBezTo>
+                  <a:pt x="20120" y="21487"/>
+                  <a:pt x="20357" y="21600"/>
+                  <a:pt x="20595" y="21600"/>
+                </a:cubicBezTo>
+                <a:cubicBezTo>
+                  <a:pt x="20817" y="21600"/>
+                  <a:pt x="21041" y="21502"/>
+                  <a:pt x="21215" y="21306"/>
+                </a:cubicBezTo>
+                <a:cubicBezTo>
+                  <a:pt x="21576" y="20901"/>
+                  <a:pt x="21591" y="20228"/>
+                  <a:pt x="21249" y="19801"/>
+                </a:cubicBezTo>
+                <a:lnTo>
+                  <a:pt x="16405" y="13751"/>
+                </a:lnTo>
+                <a:lnTo>
+                  <a:pt x="16386" y="13745"/>
+                </a:lnTo>
+                <a:cubicBezTo>
+                  <a:pt x="15765" y="12979"/>
+                  <a:pt x="14984" y="12669"/>
+                  <a:pt x="14984" y="12669"/>
+                </a:cubicBezTo>
+                <a:lnTo>
+                  <a:pt x="9780" y="10906"/>
+                </a:lnTo>
+                <a:lnTo>
+                  <a:pt x="6652" y="4532"/>
+                </a:lnTo>
+                <a:cubicBezTo>
+                  <a:pt x="6437" y="4095"/>
+                  <a:pt x="6060" y="3839"/>
+                  <a:pt x="5664" y="3808"/>
+                </a:cubicBezTo>
+                <a:close/>
+                <a:moveTo>
+                  <a:pt x="10793" y="7306"/>
+                </a:moveTo>
+                <a:cubicBezTo>
+                  <a:pt x="10765" y="7298"/>
+                  <a:pt x="10736" y="7320"/>
+                  <a:pt x="10729" y="7354"/>
+                </a:cubicBezTo>
+                <a:lnTo>
+                  <a:pt x="10195" y="9969"/>
+                </a:lnTo>
+                <a:cubicBezTo>
+                  <a:pt x="10188" y="10004"/>
+                  <a:pt x="10205" y="10039"/>
+                  <a:pt x="10234" y="10047"/>
+                </a:cubicBezTo>
+                <a:lnTo>
+                  <a:pt x="14835" y="11365"/>
+                </a:lnTo>
+                <a:cubicBezTo>
+                  <a:pt x="14864" y="11373"/>
+                  <a:pt x="14893" y="11351"/>
+                  <a:pt x="14900" y="11317"/>
+                </a:cubicBezTo>
+                <a:lnTo>
+                  <a:pt x="15434" y="8700"/>
+                </a:lnTo>
+                <a:cubicBezTo>
+                  <a:pt x="15441" y="8665"/>
+                  <a:pt x="15424" y="8632"/>
+                  <a:pt x="15395" y="8624"/>
+                </a:cubicBezTo>
+                <a:lnTo>
+                  <a:pt x="10793" y="7306"/>
+                </a:lnTo>
+                <a:close/>
+                <a:moveTo>
+                  <a:pt x="15896" y="8809"/>
+                </a:moveTo>
+                <a:lnTo>
+                  <a:pt x="15339" y="11493"/>
+                </a:lnTo>
+                <a:cubicBezTo>
+                  <a:pt x="16070" y="11705"/>
+                  <a:pt x="16785" y="11277"/>
+                  <a:pt x="16939" y="10536"/>
+                </a:cubicBezTo>
+                <a:cubicBezTo>
+                  <a:pt x="17093" y="9796"/>
+                  <a:pt x="16626" y="9022"/>
+                  <a:pt x="15896" y="8809"/>
+                </a:cubicBezTo>
+                <a:close/>
+                <a:moveTo>
+                  <a:pt x="19292" y="11121"/>
+                </a:moveTo>
+                <a:cubicBezTo>
+                  <a:pt x="18734" y="11078"/>
+                  <a:pt x="18169" y="11353"/>
+                  <a:pt x="17800" y="11916"/>
+                </a:cubicBezTo>
+                <a:cubicBezTo>
+                  <a:pt x="17211" y="12817"/>
+                  <a:pt x="17348" y="14115"/>
+                  <a:pt x="18109" y="14813"/>
+                </a:cubicBezTo>
+                <a:cubicBezTo>
+                  <a:pt x="18630" y="15292"/>
+                  <a:pt x="19309" y="15364"/>
+                  <a:pt x="19874" y="15073"/>
+                </a:cubicBezTo>
+                <a:lnTo>
+                  <a:pt x="20405" y="15708"/>
+                </a:lnTo>
+                <a:lnTo>
+                  <a:pt x="20964" y="14853"/>
+                </a:lnTo>
+                <a:lnTo>
+                  <a:pt x="20990" y="14813"/>
+                </a:lnTo>
+                <a:lnTo>
+                  <a:pt x="21549" y="13959"/>
+                </a:lnTo>
+                <a:lnTo>
+                  <a:pt x="20899" y="13507"/>
+                </a:lnTo>
+                <a:cubicBezTo>
+                  <a:pt x="20996" y="12787"/>
+                  <a:pt x="20766" y="12028"/>
+                  <a:pt x="20245" y="11549"/>
+                </a:cubicBezTo>
+                <a:cubicBezTo>
+                  <a:pt x="19959" y="11287"/>
+                  <a:pt x="19627" y="11147"/>
+                  <a:pt x="19292" y="11121"/>
+                </a:cubicBezTo>
+                <a:close/>
+              </a:path>
+            </a:pathLst>
+          </a:custGeom>
+          <a:solidFill>
+            <a:schemeClr val="accent1">
+              <a:hueOff val="450000"/>
+              <a:satOff val="-18071"/>
+              <a:lumOff val="-14609"/>
+            </a:schemeClr>
+          </a:solidFill>
+          <a:ln w="12700">
+            <a:miter lim="400000"/>
+          </a:ln>
+          <a:extLst>
+            <a:ext uri="{C572A759-6A51-4108-AA02-DFA0A04FC94B}">
+              <ma14:wrappingTextBoxFlag xmlns:ma14="http://schemas.microsoft.com/office/mac/drawingml/2011/main" val="1"/>
+            </a:ext>
+          </a:extLst>
+        </p:spPr>
+        <p:txBody>
+          <a:bodyPr lIns="50800" tIns="50800" rIns="50800" bIns="50800" anchor="ctr"/>
+          <a:lstStyle>
+            <a:lvl1pPr>
+              <a:defRPr cap="all" spc="384" sz="2400">
+                <a:latin typeface="Avenir Medium"/>
+                <a:ea typeface="Avenir Medium"/>
+                <a:cs typeface="Avenir Medium"/>
+                <a:sym typeface="Avenir Medium"/>
+              </a:defRPr>
+            </a:lvl1pPr>
+          </a:lstStyle>
+          <a:p>
+            <a:pPr/>
+            <a:r>
+              <a:t>customers</a:t>
+            </a:r>
+          </a:p>
+        </p:txBody>
+      </p:sp>
+      <p:sp>
+        <p:nvSpPr>
+          <p:cNvPr id="216" name="bookings"/>
+          <p:cNvSpPr/>
+          <p:nvPr/>
+        </p:nvSpPr>
+        <p:spPr>
+          <a:xfrm>
+            <a:off x="1576207" y="6073720"/>
+            <a:ext cx="3979289" cy="2590319"/>
+          </a:xfrm>
+          <a:custGeom>
+            <a:avLst/>
+            <a:gdLst/>
+            <a:ahLst/>
+            <a:cxnLst>
+              <a:cxn ang="0">
+                <a:pos x="wd2" y="hd2"/>
+              </a:cxn>
+              <a:cxn ang="5400000">
+                <a:pos x="wd2" y="hd2"/>
+              </a:cxn>
+              <a:cxn ang="10800000">
+                <a:pos x="wd2" y="hd2"/>
+              </a:cxn>
+              <a:cxn ang="16200000">
+                <a:pos x="wd2" y="hd2"/>
+              </a:cxn>
+            </a:cxnLst>
+            <a:rect l="0" t="0" r="r" b="b"/>
+            <a:pathLst>
+              <a:path w="21600" h="21600" fill="norm" stroke="1" extrusionOk="0">
+                <a:moveTo>
+                  <a:pt x="1515" y="0"/>
+                </a:moveTo>
+                <a:cubicBezTo>
+                  <a:pt x="678" y="0"/>
+                  <a:pt x="0" y="1042"/>
+                  <a:pt x="0" y="2327"/>
+                </a:cubicBezTo>
+                <a:lnTo>
+                  <a:pt x="0" y="19273"/>
+                </a:lnTo>
+                <a:cubicBezTo>
+                  <a:pt x="0" y="20558"/>
+                  <a:pt x="678" y="21600"/>
+                  <a:pt x="1515" y="21600"/>
+                </a:cubicBezTo>
+                <a:lnTo>
+                  <a:pt x="20085" y="21600"/>
+                </a:lnTo>
+                <a:cubicBezTo>
+                  <a:pt x="20922" y="21600"/>
+                  <a:pt x="21600" y="20558"/>
+                  <a:pt x="21600" y="19273"/>
+                </a:cubicBezTo>
+                <a:lnTo>
+                  <a:pt x="21600" y="2327"/>
+                </a:lnTo>
+                <a:cubicBezTo>
+                  <a:pt x="21600" y="1042"/>
+                  <a:pt x="20922" y="0"/>
+                  <a:pt x="20085" y="0"/>
+                </a:cubicBezTo>
+                <a:lnTo>
+                  <a:pt x="1515" y="0"/>
+                </a:lnTo>
+                <a:close/>
+                <a:moveTo>
+                  <a:pt x="2576" y="7104"/>
+                </a:moveTo>
+                <a:lnTo>
+                  <a:pt x="2756" y="7104"/>
+                </a:lnTo>
+                <a:lnTo>
+                  <a:pt x="2756" y="8874"/>
+                </a:lnTo>
+                <a:lnTo>
+                  <a:pt x="1451" y="8874"/>
+                </a:lnTo>
+                <a:lnTo>
+                  <a:pt x="1451" y="8832"/>
+                </a:lnTo>
+                <a:cubicBezTo>
+                  <a:pt x="1451" y="7879"/>
+                  <a:pt x="1955" y="7104"/>
+                  <a:pt x="2576" y="7104"/>
+                </a:cubicBezTo>
+                <a:close/>
+                <a:moveTo>
+                  <a:pt x="3071" y="7104"/>
+                </a:moveTo>
+                <a:lnTo>
+                  <a:pt x="4765" y="7104"/>
+                </a:lnTo>
+                <a:cubicBezTo>
+                  <a:pt x="5385" y="7104"/>
+                  <a:pt x="5889" y="7879"/>
+                  <a:pt x="5889" y="8832"/>
+                </a:cubicBezTo>
+                <a:lnTo>
+                  <a:pt x="5889" y="8874"/>
+                </a:lnTo>
+                <a:lnTo>
+                  <a:pt x="3071" y="8874"/>
+                </a:lnTo>
+                <a:lnTo>
+                  <a:pt x="3071" y="7104"/>
+                </a:lnTo>
+                <a:close/>
+                <a:moveTo>
+                  <a:pt x="1451" y="9356"/>
+                </a:moveTo>
+                <a:lnTo>
+                  <a:pt x="2756" y="9356"/>
+                </a:lnTo>
+                <a:lnTo>
+                  <a:pt x="2756" y="10879"/>
+                </a:lnTo>
+                <a:lnTo>
+                  <a:pt x="1451" y="10879"/>
+                </a:lnTo>
+                <a:lnTo>
+                  <a:pt x="1451" y="9356"/>
+                </a:lnTo>
+                <a:close/>
+                <a:moveTo>
+                  <a:pt x="3071" y="9356"/>
+                </a:moveTo>
+                <a:lnTo>
+                  <a:pt x="4236" y="9356"/>
+                </a:lnTo>
+                <a:lnTo>
+                  <a:pt x="4236" y="10879"/>
+                </a:lnTo>
+                <a:lnTo>
+                  <a:pt x="3071" y="10879"/>
+                </a:lnTo>
+                <a:lnTo>
+                  <a:pt x="3071" y="9356"/>
+                </a:lnTo>
+                <a:close/>
+                <a:moveTo>
+                  <a:pt x="4550" y="9356"/>
+                </a:moveTo>
+                <a:lnTo>
+                  <a:pt x="5889" y="9356"/>
+                </a:lnTo>
+                <a:lnTo>
+                  <a:pt x="5889" y="10879"/>
+                </a:lnTo>
+                <a:lnTo>
+                  <a:pt x="4550" y="10879"/>
+                </a:lnTo>
+                <a:lnTo>
+                  <a:pt x="4550" y="9356"/>
+                </a:lnTo>
+                <a:close/>
+                <a:moveTo>
+                  <a:pt x="1451" y="11362"/>
+                </a:moveTo>
+                <a:lnTo>
+                  <a:pt x="2756" y="11362"/>
+                </a:lnTo>
+                <a:lnTo>
+                  <a:pt x="2756" y="13121"/>
+                </a:lnTo>
+                <a:lnTo>
+                  <a:pt x="2576" y="13121"/>
+                </a:lnTo>
+                <a:cubicBezTo>
+                  <a:pt x="1955" y="13121"/>
+                  <a:pt x="1451" y="12349"/>
+                  <a:pt x="1451" y="11395"/>
+                </a:cubicBezTo>
+                <a:lnTo>
+                  <a:pt x="1451" y="11362"/>
+                </a:lnTo>
+                <a:close/>
+                <a:moveTo>
+                  <a:pt x="3071" y="11362"/>
+                </a:moveTo>
+                <a:lnTo>
+                  <a:pt x="4236" y="11362"/>
+                </a:lnTo>
+                <a:lnTo>
+                  <a:pt x="4236" y="13121"/>
+                </a:lnTo>
+                <a:lnTo>
+                  <a:pt x="3071" y="13121"/>
+                </a:lnTo>
+                <a:lnTo>
+                  <a:pt x="3071" y="11362"/>
+                </a:lnTo>
+                <a:close/>
+                <a:moveTo>
+                  <a:pt x="4550" y="11362"/>
+                </a:moveTo>
+                <a:lnTo>
+                  <a:pt x="5889" y="11362"/>
+                </a:lnTo>
+                <a:lnTo>
+                  <a:pt x="5889" y="11395"/>
+                </a:lnTo>
+                <a:cubicBezTo>
+                  <a:pt x="5889" y="12349"/>
+                  <a:pt x="5385" y="13121"/>
+                  <a:pt x="4765" y="13121"/>
+                </a:cubicBezTo>
+                <a:lnTo>
+                  <a:pt x="4550" y="13121"/>
+                </a:lnTo>
+                <a:lnTo>
+                  <a:pt x="4550" y="11362"/>
+                </a:lnTo>
+                <a:close/>
+                <a:moveTo>
+                  <a:pt x="1662" y="16421"/>
+                </a:moveTo>
+                <a:lnTo>
+                  <a:pt x="2082" y="16421"/>
+                </a:lnTo>
+                <a:cubicBezTo>
+                  <a:pt x="2162" y="16421"/>
+                  <a:pt x="2224" y="16520"/>
+                  <a:pt x="2224" y="16647"/>
+                </a:cubicBezTo>
+                <a:lnTo>
+                  <a:pt x="2224" y="17908"/>
+                </a:lnTo>
+                <a:cubicBezTo>
+                  <a:pt x="2224" y="18015"/>
+                  <a:pt x="2157" y="18113"/>
+                  <a:pt x="2084" y="18113"/>
+                </a:cubicBezTo>
+                <a:lnTo>
+                  <a:pt x="1659" y="18113"/>
+                </a:lnTo>
+                <a:cubicBezTo>
+                  <a:pt x="1586" y="18113"/>
+                  <a:pt x="1523" y="18012"/>
+                  <a:pt x="1523" y="17898"/>
+                </a:cubicBezTo>
+                <a:lnTo>
+                  <a:pt x="1523" y="16639"/>
+                </a:lnTo>
+                <a:cubicBezTo>
+                  <a:pt x="1523" y="16520"/>
+                  <a:pt x="1586" y="16421"/>
+                  <a:pt x="1662" y="16421"/>
+                </a:cubicBezTo>
+                <a:close/>
+                <a:moveTo>
+                  <a:pt x="2613" y="16421"/>
+                </a:moveTo>
+                <a:lnTo>
+                  <a:pt x="2626" y="16421"/>
+                </a:lnTo>
+                <a:lnTo>
+                  <a:pt x="2952" y="16421"/>
+                </a:lnTo>
+                <a:lnTo>
+                  <a:pt x="2952" y="17898"/>
+                </a:lnTo>
+                <a:lnTo>
+                  <a:pt x="3092" y="17898"/>
+                </a:lnTo>
+                <a:lnTo>
+                  <a:pt x="3092" y="17490"/>
+                </a:lnTo>
+                <a:lnTo>
+                  <a:pt x="3092" y="17467"/>
+                </a:lnTo>
+                <a:cubicBezTo>
+                  <a:pt x="3094" y="17393"/>
+                  <a:pt x="3122" y="17345"/>
+                  <a:pt x="3163" y="17345"/>
+                </a:cubicBezTo>
+                <a:cubicBezTo>
+                  <a:pt x="3206" y="17345"/>
+                  <a:pt x="3234" y="17393"/>
+                  <a:pt x="3234" y="17464"/>
+                </a:cubicBezTo>
+                <a:lnTo>
+                  <a:pt x="3234" y="17488"/>
+                </a:lnTo>
+                <a:lnTo>
+                  <a:pt x="3234" y="17994"/>
+                </a:lnTo>
+                <a:cubicBezTo>
+                  <a:pt x="3234" y="18065"/>
+                  <a:pt x="3206" y="18113"/>
+                  <a:pt x="3168" y="18113"/>
+                </a:cubicBezTo>
+                <a:lnTo>
+                  <a:pt x="2626" y="18113"/>
+                </a:lnTo>
+                <a:lnTo>
+                  <a:pt x="2613" y="18113"/>
+                </a:lnTo>
+                <a:cubicBezTo>
+                  <a:pt x="2565" y="18113"/>
+                  <a:pt x="2533" y="18070"/>
+                  <a:pt x="2533" y="18006"/>
+                </a:cubicBezTo>
+                <a:cubicBezTo>
+                  <a:pt x="2533" y="17940"/>
+                  <a:pt x="2565" y="17897"/>
+                  <a:pt x="2613" y="17898"/>
+                </a:cubicBezTo>
+                <a:lnTo>
+                  <a:pt x="2626" y="17898"/>
+                </a:lnTo>
+                <a:lnTo>
+                  <a:pt x="2812" y="17898"/>
+                </a:lnTo>
+                <a:lnTo>
+                  <a:pt x="2812" y="16639"/>
+                </a:lnTo>
+                <a:lnTo>
+                  <a:pt x="2626" y="16639"/>
+                </a:lnTo>
+                <a:lnTo>
+                  <a:pt x="2613" y="16639"/>
+                </a:lnTo>
+                <a:cubicBezTo>
+                  <a:pt x="2565" y="16637"/>
+                  <a:pt x="2533" y="16594"/>
+                  <a:pt x="2533" y="16530"/>
+                </a:cubicBezTo>
+                <a:cubicBezTo>
+                  <a:pt x="2533" y="16464"/>
+                  <a:pt x="2565" y="16421"/>
+                  <a:pt x="2613" y="16421"/>
+                </a:cubicBezTo>
+                <a:close/>
+                <a:moveTo>
+                  <a:pt x="3619" y="16421"/>
+                </a:moveTo>
+                <a:lnTo>
+                  <a:pt x="3635" y="16421"/>
+                </a:lnTo>
+                <a:lnTo>
+                  <a:pt x="4099" y="16421"/>
+                </a:lnTo>
+                <a:cubicBezTo>
+                  <a:pt x="4182" y="16421"/>
+                  <a:pt x="4244" y="16517"/>
+                  <a:pt x="4244" y="16647"/>
+                </a:cubicBezTo>
+                <a:lnTo>
+                  <a:pt x="4243" y="17158"/>
+                </a:lnTo>
+                <a:cubicBezTo>
+                  <a:pt x="4243" y="17285"/>
+                  <a:pt x="4182" y="17379"/>
+                  <a:pt x="4101" y="17379"/>
+                </a:cubicBezTo>
+                <a:lnTo>
+                  <a:pt x="3685" y="17379"/>
+                </a:lnTo>
+                <a:lnTo>
+                  <a:pt x="3685" y="17898"/>
+                </a:lnTo>
+                <a:lnTo>
+                  <a:pt x="4148" y="17898"/>
+                </a:lnTo>
+                <a:lnTo>
+                  <a:pt x="4163" y="17898"/>
+                </a:lnTo>
+                <a:cubicBezTo>
+                  <a:pt x="4213" y="17898"/>
+                  <a:pt x="4243" y="17940"/>
+                  <a:pt x="4243" y="18006"/>
+                </a:cubicBezTo>
+                <a:cubicBezTo>
+                  <a:pt x="4243" y="18070"/>
+                  <a:pt x="4213" y="18113"/>
+                  <a:pt x="4165" y="18113"/>
+                </a:cubicBezTo>
+                <a:lnTo>
+                  <a:pt x="4150" y="18113"/>
+                </a:lnTo>
+                <a:lnTo>
+                  <a:pt x="3540" y="18113"/>
+                </a:lnTo>
+                <a:lnTo>
+                  <a:pt x="3540" y="17379"/>
+                </a:lnTo>
+                <a:cubicBezTo>
+                  <a:pt x="3540" y="17252"/>
+                  <a:pt x="3603" y="17158"/>
+                  <a:pt x="3685" y="17158"/>
+                </a:cubicBezTo>
+                <a:lnTo>
+                  <a:pt x="4099" y="17158"/>
+                </a:lnTo>
+                <a:lnTo>
+                  <a:pt x="4099" y="16637"/>
+                </a:lnTo>
+                <a:lnTo>
+                  <a:pt x="3635" y="16637"/>
+                </a:lnTo>
+                <a:lnTo>
+                  <a:pt x="3619" y="16637"/>
+                </a:lnTo>
+                <a:cubicBezTo>
+                  <a:pt x="3573" y="16637"/>
+                  <a:pt x="3540" y="16594"/>
+                  <a:pt x="3540" y="16530"/>
+                </a:cubicBezTo>
+                <a:cubicBezTo>
+                  <a:pt x="3540" y="16464"/>
+                  <a:pt x="3571" y="16421"/>
+                  <a:pt x="3619" y="16421"/>
+                </a:cubicBezTo>
+                <a:close/>
+                <a:moveTo>
+                  <a:pt x="4628" y="16421"/>
+                </a:moveTo>
+                <a:lnTo>
+                  <a:pt x="4643" y="16421"/>
+                </a:lnTo>
+                <a:lnTo>
+                  <a:pt x="5107" y="16421"/>
+                </a:lnTo>
+                <a:cubicBezTo>
+                  <a:pt x="5184" y="16421"/>
+                  <a:pt x="5246" y="16506"/>
+                  <a:pt x="5246" y="16608"/>
+                </a:cubicBezTo>
+                <a:lnTo>
+                  <a:pt x="5246" y="17080"/>
+                </a:lnTo>
+                <a:cubicBezTo>
+                  <a:pt x="5246" y="17156"/>
+                  <a:pt x="5232" y="17211"/>
+                  <a:pt x="5195" y="17270"/>
+                </a:cubicBezTo>
+                <a:cubicBezTo>
+                  <a:pt x="5237" y="17341"/>
+                  <a:pt x="5249" y="17394"/>
+                  <a:pt x="5249" y="17490"/>
+                </a:cubicBezTo>
+                <a:lnTo>
+                  <a:pt x="5249" y="17898"/>
+                </a:lnTo>
+                <a:cubicBezTo>
+                  <a:pt x="5249" y="18020"/>
+                  <a:pt x="5189" y="18113"/>
+                  <a:pt x="5109" y="18113"/>
+                </a:cubicBezTo>
+                <a:lnTo>
+                  <a:pt x="4645" y="18113"/>
+                </a:lnTo>
+                <a:lnTo>
+                  <a:pt x="4629" y="18113"/>
+                </a:lnTo>
+                <a:cubicBezTo>
+                  <a:pt x="4581" y="18113"/>
+                  <a:pt x="4548" y="18070"/>
+                  <a:pt x="4548" y="18006"/>
+                </a:cubicBezTo>
+                <a:cubicBezTo>
+                  <a:pt x="4548" y="17940"/>
+                  <a:pt x="4582" y="17897"/>
+                  <a:pt x="4628" y="17898"/>
+                </a:cubicBezTo>
+                <a:lnTo>
+                  <a:pt x="4643" y="17898"/>
+                </a:lnTo>
+                <a:lnTo>
+                  <a:pt x="5107" y="17898"/>
+                </a:lnTo>
+                <a:lnTo>
+                  <a:pt x="5107" y="17508"/>
+                </a:lnTo>
+                <a:cubicBezTo>
+                  <a:pt x="5109" y="17422"/>
+                  <a:pt x="5083" y="17376"/>
+                  <a:pt x="5033" y="17376"/>
+                </a:cubicBezTo>
+                <a:lnTo>
+                  <a:pt x="4785" y="17376"/>
+                </a:lnTo>
+                <a:lnTo>
+                  <a:pt x="4770" y="17376"/>
+                </a:lnTo>
+                <a:cubicBezTo>
+                  <a:pt x="4722" y="17376"/>
+                  <a:pt x="4690" y="17333"/>
+                  <a:pt x="4690" y="17270"/>
+                </a:cubicBezTo>
+                <a:cubicBezTo>
+                  <a:pt x="4690" y="17206"/>
+                  <a:pt x="4723" y="17161"/>
+                  <a:pt x="4770" y="17161"/>
+                </a:cubicBezTo>
+                <a:lnTo>
+                  <a:pt x="4783" y="17161"/>
+                </a:lnTo>
+                <a:lnTo>
+                  <a:pt x="5033" y="17161"/>
+                </a:lnTo>
+                <a:cubicBezTo>
+                  <a:pt x="5081" y="17161"/>
+                  <a:pt x="5106" y="17115"/>
+                  <a:pt x="5106" y="17026"/>
+                </a:cubicBezTo>
+                <a:lnTo>
+                  <a:pt x="5106" y="16637"/>
+                </a:lnTo>
+                <a:lnTo>
+                  <a:pt x="4645" y="16637"/>
+                </a:lnTo>
+                <a:lnTo>
+                  <a:pt x="4629" y="16637"/>
+                </a:lnTo>
+                <a:cubicBezTo>
+                  <a:pt x="4581" y="16637"/>
+                  <a:pt x="4548" y="16594"/>
+                  <a:pt x="4548" y="16530"/>
+                </a:cubicBezTo>
+                <a:cubicBezTo>
+                  <a:pt x="4548" y="16464"/>
+                  <a:pt x="4582" y="16421"/>
+                  <a:pt x="4628" y="16421"/>
+                </a:cubicBezTo>
+                <a:close/>
+                <a:moveTo>
+                  <a:pt x="6648" y="16421"/>
+                </a:moveTo>
+                <a:cubicBezTo>
+                  <a:pt x="6689" y="16421"/>
+                  <a:pt x="6717" y="16469"/>
+                  <a:pt x="6717" y="16541"/>
+                </a:cubicBezTo>
+                <a:lnTo>
+                  <a:pt x="6717" y="16564"/>
+                </a:lnTo>
+                <a:lnTo>
+                  <a:pt x="6717" y="17342"/>
+                </a:lnTo>
+                <a:lnTo>
+                  <a:pt x="6994" y="17342"/>
+                </a:lnTo>
+                <a:lnTo>
+                  <a:pt x="6994" y="16751"/>
+                </a:lnTo>
+                <a:lnTo>
+                  <a:pt x="6994" y="16727"/>
+                </a:lnTo>
+                <a:cubicBezTo>
+                  <a:pt x="6996" y="16656"/>
+                  <a:pt x="7023" y="16608"/>
+                  <a:pt x="7067" y="16608"/>
+                </a:cubicBezTo>
+                <a:cubicBezTo>
+                  <a:pt x="7108" y="16608"/>
+                  <a:pt x="7136" y="16656"/>
+                  <a:pt x="7136" y="16727"/>
+                </a:cubicBezTo>
+                <a:lnTo>
+                  <a:pt x="7136" y="16751"/>
+                </a:lnTo>
+                <a:lnTo>
+                  <a:pt x="7136" y="17342"/>
+                </a:lnTo>
+                <a:cubicBezTo>
+                  <a:pt x="7185" y="17352"/>
+                  <a:pt x="7208" y="17385"/>
+                  <a:pt x="7208" y="17449"/>
+                </a:cubicBezTo>
+                <a:cubicBezTo>
+                  <a:pt x="7208" y="17504"/>
+                  <a:pt x="7176" y="17558"/>
+                  <a:pt x="7144" y="17558"/>
+                </a:cubicBezTo>
+                <a:lnTo>
+                  <a:pt x="7138" y="17558"/>
+                </a:lnTo>
+                <a:lnTo>
+                  <a:pt x="7138" y="17968"/>
+                </a:lnTo>
+                <a:lnTo>
+                  <a:pt x="7138" y="17991"/>
+                </a:lnTo>
+                <a:cubicBezTo>
+                  <a:pt x="7136" y="18065"/>
+                  <a:pt x="7108" y="18113"/>
+                  <a:pt x="7067" y="18113"/>
+                </a:cubicBezTo>
+                <a:cubicBezTo>
+                  <a:pt x="7023" y="18113"/>
+                  <a:pt x="6996" y="18065"/>
+                  <a:pt x="6996" y="17994"/>
+                </a:cubicBezTo>
+                <a:lnTo>
+                  <a:pt x="6996" y="17970"/>
+                </a:lnTo>
+                <a:lnTo>
+                  <a:pt x="6996" y="17560"/>
+                </a:lnTo>
+                <a:lnTo>
+                  <a:pt x="6577" y="17560"/>
+                </a:lnTo>
+                <a:lnTo>
+                  <a:pt x="6577" y="16569"/>
+                </a:lnTo>
+                <a:lnTo>
+                  <a:pt x="6577" y="16546"/>
+                </a:lnTo>
+                <a:cubicBezTo>
+                  <a:pt x="6577" y="16470"/>
+                  <a:pt x="6605" y="16421"/>
+                  <a:pt x="6648" y="16421"/>
+                </a:cubicBezTo>
+                <a:close/>
+                <a:moveTo>
+                  <a:pt x="8592" y="16421"/>
+                </a:moveTo>
+                <a:lnTo>
+                  <a:pt x="8663" y="16421"/>
+                </a:lnTo>
+                <a:cubicBezTo>
+                  <a:pt x="8704" y="16421"/>
+                  <a:pt x="8735" y="16469"/>
+                  <a:pt x="8735" y="16530"/>
+                </a:cubicBezTo>
+                <a:cubicBezTo>
+                  <a:pt x="8735" y="16591"/>
+                  <a:pt x="8711" y="16629"/>
+                  <a:pt x="8664" y="16634"/>
+                </a:cubicBezTo>
+                <a:lnTo>
+                  <a:pt x="8664" y="17337"/>
+                </a:lnTo>
+                <a:lnTo>
+                  <a:pt x="9156" y="17337"/>
+                </a:lnTo>
+                <a:cubicBezTo>
+                  <a:pt x="9197" y="17337"/>
+                  <a:pt x="9223" y="17385"/>
+                  <a:pt x="9223" y="17454"/>
+                </a:cubicBezTo>
+                <a:lnTo>
+                  <a:pt x="9223" y="18001"/>
+                </a:lnTo>
+                <a:cubicBezTo>
+                  <a:pt x="9223" y="18067"/>
+                  <a:pt x="9194" y="18113"/>
+                  <a:pt x="9149" y="18113"/>
+                </a:cubicBezTo>
+                <a:lnTo>
+                  <a:pt x="8597" y="18113"/>
+                </a:lnTo>
+                <a:cubicBezTo>
+                  <a:pt x="8555" y="18113"/>
+                  <a:pt x="8522" y="18065"/>
+                  <a:pt x="8522" y="18004"/>
+                </a:cubicBezTo>
+                <a:lnTo>
+                  <a:pt x="8522" y="16525"/>
+                </a:lnTo>
+                <a:cubicBezTo>
+                  <a:pt x="8522" y="16467"/>
+                  <a:pt x="8554" y="16421"/>
+                  <a:pt x="8592" y="16421"/>
+                </a:cubicBezTo>
+                <a:close/>
+                <a:moveTo>
+                  <a:pt x="9608" y="16421"/>
+                </a:moveTo>
+                <a:lnTo>
+                  <a:pt x="10233" y="16421"/>
+                </a:lnTo>
+                <a:lnTo>
+                  <a:pt x="10235" y="17078"/>
+                </a:lnTo>
+                <a:cubicBezTo>
+                  <a:pt x="10235" y="17121"/>
+                  <a:pt x="10228" y="17146"/>
+                  <a:pt x="10208" y="17171"/>
+                </a:cubicBezTo>
+                <a:lnTo>
+                  <a:pt x="9983" y="17467"/>
+                </a:lnTo>
+                <a:cubicBezTo>
+                  <a:pt x="9964" y="17495"/>
+                  <a:pt x="9956" y="17517"/>
+                  <a:pt x="9956" y="17555"/>
+                </a:cubicBezTo>
+                <a:lnTo>
+                  <a:pt x="9956" y="17968"/>
+                </a:lnTo>
+                <a:lnTo>
+                  <a:pt x="9956" y="17991"/>
+                </a:lnTo>
+                <a:cubicBezTo>
+                  <a:pt x="9956" y="18065"/>
+                  <a:pt x="9927" y="18113"/>
+                  <a:pt x="9885" y="18113"/>
+                </a:cubicBezTo>
+                <a:cubicBezTo>
+                  <a:pt x="9844" y="18113"/>
+                  <a:pt x="9816" y="18065"/>
+                  <a:pt x="9816" y="17994"/>
+                </a:cubicBezTo>
+                <a:lnTo>
+                  <a:pt x="9816" y="17970"/>
+                </a:lnTo>
+                <a:lnTo>
+                  <a:pt x="9816" y="17454"/>
+                </a:lnTo>
+                <a:cubicBezTo>
+                  <a:pt x="9816" y="17416"/>
+                  <a:pt x="9822" y="17396"/>
+                  <a:pt x="9840" y="17371"/>
+                </a:cubicBezTo>
+                <a:lnTo>
+                  <a:pt x="10061" y="17078"/>
+                </a:lnTo>
+                <a:cubicBezTo>
+                  <a:pt x="10091" y="17040"/>
+                  <a:pt x="10095" y="17024"/>
+                  <a:pt x="10095" y="16963"/>
+                </a:cubicBezTo>
+                <a:lnTo>
+                  <a:pt x="10095" y="16637"/>
+                </a:lnTo>
+                <a:lnTo>
+                  <a:pt x="9673" y="16637"/>
+                </a:lnTo>
+                <a:cubicBezTo>
+                  <a:pt x="9666" y="16700"/>
+                  <a:pt x="9643" y="16735"/>
+                  <a:pt x="9605" y="16735"/>
+                </a:cubicBezTo>
+                <a:cubicBezTo>
+                  <a:pt x="9564" y="16735"/>
+                  <a:pt x="9534" y="16687"/>
+                  <a:pt x="9534" y="16621"/>
+                </a:cubicBezTo>
+                <a:lnTo>
+                  <a:pt x="9534" y="16608"/>
+                </a:lnTo>
+                <a:lnTo>
+                  <a:pt x="9534" y="16548"/>
+                </a:lnTo>
+                <a:cubicBezTo>
+                  <a:pt x="9534" y="16467"/>
+                  <a:pt x="9561" y="16421"/>
+                  <a:pt x="9608" y="16421"/>
+                </a:cubicBezTo>
+                <a:close/>
+                <a:moveTo>
+                  <a:pt x="11698" y="16421"/>
+                </a:moveTo>
+                <a:lnTo>
+                  <a:pt x="11975" y="16421"/>
+                </a:lnTo>
+                <a:cubicBezTo>
+                  <a:pt x="12016" y="16421"/>
+                  <a:pt x="12047" y="16472"/>
+                  <a:pt x="12047" y="16538"/>
+                </a:cubicBezTo>
+                <a:lnTo>
+                  <a:pt x="12047" y="17161"/>
+                </a:lnTo>
+                <a:cubicBezTo>
+                  <a:pt x="12137" y="17176"/>
+                  <a:pt x="12187" y="17257"/>
+                  <a:pt x="12187" y="17389"/>
+                </a:cubicBezTo>
+                <a:lnTo>
+                  <a:pt x="12187" y="17895"/>
+                </a:lnTo>
+                <a:cubicBezTo>
+                  <a:pt x="12187" y="18017"/>
+                  <a:pt x="12123" y="18113"/>
+                  <a:pt x="12047" y="18113"/>
+                </a:cubicBezTo>
+                <a:lnTo>
+                  <a:pt x="11622" y="18113"/>
+                </a:lnTo>
+                <a:cubicBezTo>
+                  <a:pt x="11549" y="18113"/>
+                  <a:pt x="11487" y="18015"/>
+                  <a:pt x="11487" y="17908"/>
+                </a:cubicBezTo>
+                <a:lnTo>
+                  <a:pt x="11487" y="17379"/>
+                </a:lnTo>
+                <a:cubicBezTo>
+                  <a:pt x="11487" y="17259"/>
+                  <a:pt x="11544" y="17171"/>
+                  <a:pt x="11625" y="17161"/>
+                </a:cubicBezTo>
+                <a:lnTo>
+                  <a:pt x="11625" y="16538"/>
+                </a:lnTo>
+                <a:cubicBezTo>
+                  <a:pt x="11625" y="16467"/>
+                  <a:pt x="11655" y="16421"/>
+                  <a:pt x="11698" y="16421"/>
+                </a:cubicBezTo>
+                <a:close/>
+                <a:moveTo>
+                  <a:pt x="12569" y="16421"/>
+                </a:moveTo>
+                <a:lnTo>
+                  <a:pt x="13121" y="16421"/>
+                </a:lnTo>
+                <a:cubicBezTo>
+                  <a:pt x="13165" y="16421"/>
+                  <a:pt x="13196" y="16469"/>
+                  <a:pt x="13196" y="16533"/>
+                </a:cubicBezTo>
+                <a:lnTo>
+                  <a:pt x="13196" y="18012"/>
+                </a:lnTo>
+                <a:cubicBezTo>
+                  <a:pt x="13196" y="18067"/>
+                  <a:pt x="13166" y="18113"/>
+                  <a:pt x="13128" y="18113"/>
+                </a:cubicBezTo>
+                <a:lnTo>
+                  <a:pt x="13057" y="18113"/>
+                </a:lnTo>
+                <a:cubicBezTo>
+                  <a:pt x="13016" y="18113"/>
+                  <a:pt x="12983" y="18065"/>
+                  <a:pt x="12983" y="18004"/>
+                </a:cubicBezTo>
+                <a:cubicBezTo>
+                  <a:pt x="12983" y="17943"/>
+                  <a:pt x="13009" y="17908"/>
+                  <a:pt x="13056" y="17900"/>
+                </a:cubicBezTo>
+                <a:lnTo>
+                  <a:pt x="13056" y="17194"/>
+                </a:lnTo>
+                <a:lnTo>
+                  <a:pt x="12564" y="17194"/>
+                </a:lnTo>
+                <a:cubicBezTo>
+                  <a:pt x="12523" y="17194"/>
+                  <a:pt x="12495" y="17149"/>
+                  <a:pt x="12495" y="17078"/>
+                </a:cubicBezTo>
+                <a:lnTo>
+                  <a:pt x="12495" y="16533"/>
+                </a:lnTo>
+                <a:cubicBezTo>
+                  <a:pt x="12495" y="16467"/>
+                  <a:pt x="12526" y="16421"/>
+                  <a:pt x="12569" y="16421"/>
+                </a:cubicBezTo>
+                <a:close/>
+                <a:moveTo>
+                  <a:pt x="13645" y="16421"/>
+                </a:moveTo>
+                <a:lnTo>
+                  <a:pt x="14064" y="16421"/>
+                </a:lnTo>
+                <a:cubicBezTo>
+                  <a:pt x="14143" y="16421"/>
+                  <a:pt x="14206" y="16520"/>
+                  <a:pt x="14206" y="16647"/>
+                </a:cubicBezTo>
+                <a:lnTo>
+                  <a:pt x="14206" y="17908"/>
+                </a:lnTo>
+                <a:cubicBezTo>
+                  <a:pt x="14206" y="18015"/>
+                  <a:pt x="14138" y="18113"/>
+                  <a:pt x="14066" y="18113"/>
+                </a:cubicBezTo>
+                <a:lnTo>
+                  <a:pt x="13642" y="18113"/>
+                </a:lnTo>
+                <a:cubicBezTo>
+                  <a:pt x="13569" y="18113"/>
+                  <a:pt x="13505" y="18012"/>
+                  <a:pt x="13505" y="17898"/>
+                </a:cubicBezTo>
+                <a:lnTo>
+                  <a:pt x="13505" y="16639"/>
+                </a:lnTo>
+                <a:cubicBezTo>
+                  <a:pt x="13505" y="16520"/>
+                  <a:pt x="13569" y="16421"/>
+                  <a:pt x="13645" y="16421"/>
+                </a:cubicBezTo>
+                <a:close/>
+                <a:moveTo>
+                  <a:pt x="14594" y="16421"/>
+                </a:moveTo>
+                <a:lnTo>
+                  <a:pt x="14609" y="16421"/>
+                </a:lnTo>
+                <a:lnTo>
+                  <a:pt x="14935" y="16421"/>
+                </a:lnTo>
+                <a:lnTo>
+                  <a:pt x="14935" y="17898"/>
+                </a:lnTo>
+                <a:lnTo>
+                  <a:pt x="15074" y="17898"/>
+                </a:lnTo>
+                <a:lnTo>
+                  <a:pt x="15074" y="17490"/>
+                </a:lnTo>
+                <a:lnTo>
+                  <a:pt x="15074" y="17467"/>
+                </a:lnTo>
+                <a:cubicBezTo>
+                  <a:pt x="15076" y="17393"/>
+                  <a:pt x="15103" y="17345"/>
+                  <a:pt x="15145" y="17345"/>
+                </a:cubicBezTo>
+                <a:cubicBezTo>
+                  <a:pt x="15188" y="17345"/>
+                  <a:pt x="15216" y="17393"/>
+                  <a:pt x="15216" y="17464"/>
+                </a:cubicBezTo>
+                <a:lnTo>
+                  <a:pt x="15216" y="17488"/>
+                </a:lnTo>
+                <a:lnTo>
+                  <a:pt x="15216" y="17994"/>
+                </a:lnTo>
+                <a:cubicBezTo>
+                  <a:pt x="15216" y="18065"/>
+                  <a:pt x="15188" y="18113"/>
+                  <a:pt x="15150" y="18113"/>
+                </a:cubicBezTo>
+                <a:lnTo>
+                  <a:pt x="14609" y="18113"/>
+                </a:lnTo>
+                <a:lnTo>
+                  <a:pt x="14594" y="18113"/>
+                </a:lnTo>
+                <a:cubicBezTo>
+                  <a:pt x="14546" y="18113"/>
+                  <a:pt x="14515" y="18070"/>
+                  <a:pt x="14515" y="18006"/>
+                </a:cubicBezTo>
+                <a:cubicBezTo>
+                  <a:pt x="14515" y="17940"/>
+                  <a:pt x="14546" y="17897"/>
+                  <a:pt x="14594" y="17898"/>
+                </a:cubicBezTo>
+                <a:lnTo>
+                  <a:pt x="14609" y="17898"/>
+                </a:lnTo>
+                <a:lnTo>
+                  <a:pt x="14794" y="17898"/>
+                </a:lnTo>
+                <a:lnTo>
+                  <a:pt x="14794" y="16639"/>
+                </a:lnTo>
+                <a:lnTo>
+                  <a:pt x="14609" y="16639"/>
+                </a:lnTo>
+                <a:lnTo>
+                  <a:pt x="14594" y="16639"/>
+                </a:lnTo>
+                <a:cubicBezTo>
+                  <a:pt x="14546" y="16637"/>
+                  <a:pt x="14515" y="16594"/>
+                  <a:pt x="14515" y="16530"/>
+                </a:cubicBezTo>
+                <a:cubicBezTo>
+                  <a:pt x="14515" y="16464"/>
+                  <a:pt x="14546" y="16421"/>
+                  <a:pt x="14594" y="16421"/>
+                </a:cubicBezTo>
+                <a:close/>
+                <a:moveTo>
+                  <a:pt x="16545" y="16421"/>
+                </a:moveTo>
+                <a:lnTo>
+                  <a:pt x="16560" y="16421"/>
+                </a:lnTo>
+                <a:lnTo>
+                  <a:pt x="17025" y="16421"/>
+                </a:lnTo>
+                <a:cubicBezTo>
+                  <a:pt x="17107" y="16421"/>
+                  <a:pt x="17168" y="16517"/>
+                  <a:pt x="17168" y="16647"/>
+                </a:cubicBezTo>
+                <a:lnTo>
+                  <a:pt x="17168" y="17158"/>
+                </a:lnTo>
+                <a:cubicBezTo>
+                  <a:pt x="17168" y="17285"/>
+                  <a:pt x="17107" y="17379"/>
+                  <a:pt x="17026" y="17379"/>
+                </a:cubicBezTo>
+                <a:lnTo>
+                  <a:pt x="16609" y="17379"/>
+                </a:lnTo>
+                <a:lnTo>
+                  <a:pt x="16609" y="17898"/>
+                </a:lnTo>
+                <a:lnTo>
+                  <a:pt x="17074" y="17898"/>
+                </a:lnTo>
+                <a:lnTo>
+                  <a:pt x="17087" y="17898"/>
+                </a:lnTo>
+                <a:cubicBezTo>
+                  <a:pt x="17137" y="17898"/>
+                  <a:pt x="17168" y="17940"/>
+                  <a:pt x="17168" y="18006"/>
+                </a:cubicBezTo>
+                <a:cubicBezTo>
+                  <a:pt x="17168" y="18070"/>
+                  <a:pt x="17137" y="18113"/>
+                  <a:pt x="17089" y="18113"/>
+                </a:cubicBezTo>
+                <a:lnTo>
+                  <a:pt x="17075" y="18113"/>
+                </a:lnTo>
+                <a:lnTo>
+                  <a:pt x="16466" y="18113"/>
+                </a:lnTo>
+                <a:lnTo>
+                  <a:pt x="16466" y="17379"/>
+                </a:lnTo>
+                <a:cubicBezTo>
+                  <a:pt x="16466" y="17252"/>
+                  <a:pt x="16527" y="17158"/>
+                  <a:pt x="16609" y="17158"/>
+                </a:cubicBezTo>
+                <a:lnTo>
+                  <a:pt x="17025" y="17158"/>
+                </a:lnTo>
+                <a:lnTo>
+                  <a:pt x="17025" y="16637"/>
+                </a:lnTo>
+                <a:lnTo>
+                  <a:pt x="16560" y="16637"/>
+                </a:lnTo>
+                <a:lnTo>
+                  <a:pt x="16545" y="16637"/>
+                </a:lnTo>
+                <a:cubicBezTo>
+                  <a:pt x="16499" y="16637"/>
+                  <a:pt x="16466" y="16594"/>
+                  <a:pt x="16466" y="16530"/>
+                </a:cubicBezTo>
+                <a:cubicBezTo>
+                  <a:pt x="16466" y="16464"/>
+                  <a:pt x="16497" y="16421"/>
+                  <a:pt x="16545" y="16421"/>
+                </a:cubicBezTo>
+                <a:close/>
+                <a:moveTo>
+                  <a:pt x="17553" y="16421"/>
+                </a:moveTo>
+                <a:lnTo>
+                  <a:pt x="17568" y="16421"/>
+                </a:lnTo>
+                <a:lnTo>
+                  <a:pt x="18033" y="16421"/>
+                </a:lnTo>
+                <a:cubicBezTo>
+                  <a:pt x="18109" y="16421"/>
+                  <a:pt x="18171" y="16506"/>
+                  <a:pt x="18171" y="16608"/>
+                </a:cubicBezTo>
+                <a:lnTo>
+                  <a:pt x="18171" y="17080"/>
+                </a:lnTo>
+                <a:cubicBezTo>
+                  <a:pt x="18171" y="17156"/>
+                  <a:pt x="18157" y="17211"/>
+                  <a:pt x="18121" y="17270"/>
+                </a:cubicBezTo>
+                <a:cubicBezTo>
+                  <a:pt x="18162" y="17341"/>
+                  <a:pt x="18175" y="17394"/>
+                  <a:pt x="18175" y="17490"/>
+                </a:cubicBezTo>
+                <a:lnTo>
+                  <a:pt x="18175" y="17898"/>
+                </a:lnTo>
+                <a:cubicBezTo>
+                  <a:pt x="18175" y="18020"/>
+                  <a:pt x="18114" y="18113"/>
+                  <a:pt x="18035" y="18113"/>
+                </a:cubicBezTo>
+                <a:lnTo>
+                  <a:pt x="17570" y="18113"/>
+                </a:lnTo>
+                <a:lnTo>
+                  <a:pt x="17555" y="18113"/>
+                </a:lnTo>
+                <a:cubicBezTo>
+                  <a:pt x="17507" y="18113"/>
+                  <a:pt x="17474" y="18070"/>
+                  <a:pt x="17474" y="18006"/>
+                </a:cubicBezTo>
+                <a:cubicBezTo>
+                  <a:pt x="17474" y="17940"/>
+                  <a:pt x="17507" y="17897"/>
+                  <a:pt x="17553" y="17898"/>
+                </a:cubicBezTo>
+                <a:lnTo>
+                  <a:pt x="17568" y="17898"/>
+                </a:lnTo>
+                <a:lnTo>
+                  <a:pt x="18033" y="17898"/>
+                </a:lnTo>
+                <a:lnTo>
+                  <a:pt x="18033" y="17508"/>
+                </a:lnTo>
+                <a:cubicBezTo>
+                  <a:pt x="18035" y="17422"/>
+                  <a:pt x="18008" y="17376"/>
+                  <a:pt x="17959" y="17376"/>
+                </a:cubicBezTo>
+                <a:lnTo>
+                  <a:pt x="17710" y="17376"/>
+                </a:lnTo>
+                <a:lnTo>
+                  <a:pt x="17695" y="17376"/>
+                </a:lnTo>
+                <a:cubicBezTo>
+                  <a:pt x="17647" y="17376"/>
+                  <a:pt x="17616" y="17333"/>
+                  <a:pt x="17616" y="17270"/>
+                </a:cubicBezTo>
+                <a:cubicBezTo>
+                  <a:pt x="17616" y="17206"/>
+                  <a:pt x="17647" y="17161"/>
+                  <a:pt x="17693" y="17161"/>
+                </a:cubicBezTo>
+                <a:lnTo>
+                  <a:pt x="17709" y="17161"/>
+                </a:lnTo>
+                <a:lnTo>
+                  <a:pt x="17959" y="17161"/>
+                </a:lnTo>
+                <a:cubicBezTo>
+                  <a:pt x="18007" y="17161"/>
+                  <a:pt x="18031" y="17115"/>
+                  <a:pt x="18031" y="17026"/>
+                </a:cubicBezTo>
+                <a:lnTo>
+                  <a:pt x="18031" y="16637"/>
+                </a:lnTo>
+                <a:lnTo>
+                  <a:pt x="17570" y="16637"/>
+                </a:lnTo>
+                <a:lnTo>
+                  <a:pt x="17555" y="16637"/>
+                </a:lnTo>
+                <a:cubicBezTo>
+                  <a:pt x="17507" y="16637"/>
+                  <a:pt x="17474" y="16594"/>
+                  <a:pt x="17474" y="16530"/>
+                </a:cubicBezTo>
+                <a:cubicBezTo>
+                  <a:pt x="17474" y="16464"/>
+                  <a:pt x="17507" y="16421"/>
+                  <a:pt x="17553" y="16421"/>
+                </a:cubicBezTo>
+                <a:close/>
+                <a:moveTo>
+                  <a:pt x="18629" y="16421"/>
+                </a:moveTo>
+                <a:cubicBezTo>
+                  <a:pt x="18671" y="16421"/>
+                  <a:pt x="18698" y="16469"/>
+                  <a:pt x="18698" y="16541"/>
+                </a:cubicBezTo>
+                <a:lnTo>
+                  <a:pt x="18698" y="16564"/>
+                </a:lnTo>
+                <a:lnTo>
+                  <a:pt x="18698" y="17342"/>
+                </a:lnTo>
+                <a:lnTo>
+                  <a:pt x="18977" y="17342"/>
+                </a:lnTo>
+                <a:lnTo>
+                  <a:pt x="18977" y="16751"/>
+                </a:lnTo>
+                <a:lnTo>
+                  <a:pt x="18977" y="16727"/>
+                </a:lnTo>
+                <a:cubicBezTo>
+                  <a:pt x="18979" y="16656"/>
+                  <a:pt x="19007" y="16608"/>
+                  <a:pt x="19050" y="16608"/>
+                </a:cubicBezTo>
+                <a:cubicBezTo>
+                  <a:pt x="19091" y="16608"/>
+                  <a:pt x="19119" y="16656"/>
+                  <a:pt x="19119" y="16727"/>
+                </a:cubicBezTo>
+                <a:lnTo>
+                  <a:pt x="19119" y="16751"/>
+                </a:lnTo>
+                <a:lnTo>
+                  <a:pt x="19119" y="17342"/>
+                </a:lnTo>
+                <a:cubicBezTo>
+                  <a:pt x="19169" y="17352"/>
+                  <a:pt x="19190" y="17385"/>
+                  <a:pt x="19190" y="17449"/>
+                </a:cubicBezTo>
+                <a:cubicBezTo>
+                  <a:pt x="19190" y="17504"/>
+                  <a:pt x="19159" y="17558"/>
+                  <a:pt x="19127" y="17558"/>
+                </a:cubicBezTo>
+                <a:lnTo>
+                  <a:pt x="19121" y="17558"/>
+                </a:lnTo>
+                <a:lnTo>
+                  <a:pt x="19121" y="17968"/>
+                </a:lnTo>
+                <a:lnTo>
+                  <a:pt x="19121" y="17991"/>
+                </a:lnTo>
+                <a:cubicBezTo>
+                  <a:pt x="19119" y="18065"/>
+                  <a:pt x="19091" y="18113"/>
+                  <a:pt x="19050" y="18113"/>
+                </a:cubicBezTo>
+                <a:cubicBezTo>
+                  <a:pt x="19007" y="18113"/>
+                  <a:pt x="18979" y="18065"/>
+                  <a:pt x="18979" y="17994"/>
+                </a:cubicBezTo>
+                <a:lnTo>
+                  <a:pt x="18979" y="17970"/>
+                </a:lnTo>
+                <a:lnTo>
+                  <a:pt x="18979" y="17560"/>
+                </a:lnTo>
+                <a:lnTo>
+                  <a:pt x="18558" y="17560"/>
+                </a:lnTo>
+                <a:lnTo>
+                  <a:pt x="18558" y="16569"/>
+                </a:lnTo>
+                <a:lnTo>
+                  <a:pt x="18558" y="16546"/>
+                </a:lnTo>
+                <a:cubicBezTo>
+                  <a:pt x="18558" y="16470"/>
+                  <a:pt x="18586" y="16421"/>
+                  <a:pt x="18629" y="16421"/>
+                </a:cubicBezTo>
+                <a:close/>
+                <a:moveTo>
+                  <a:pt x="7653" y="16424"/>
+                </a:moveTo>
+                <a:lnTo>
+                  <a:pt x="8117" y="16424"/>
+                </a:lnTo>
+                <a:lnTo>
+                  <a:pt x="8132" y="16424"/>
+                </a:lnTo>
+                <a:cubicBezTo>
+                  <a:pt x="8182" y="16421"/>
+                  <a:pt x="8213" y="16464"/>
+                  <a:pt x="8213" y="16530"/>
+                </a:cubicBezTo>
+                <a:cubicBezTo>
+                  <a:pt x="8213" y="16594"/>
+                  <a:pt x="8182" y="16637"/>
+                  <a:pt x="8134" y="16637"/>
+                </a:cubicBezTo>
+                <a:lnTo>
+                  <a:pt x="8119" y="16637"/>
+                </a:lnTo>
+                <a:lnTo>
+                  <a:pt x="7796" y="16637"/>
+                </a:lnTo>
+                <a:lnTo>
+                  <a:pt x="7795" y="17163"/>
+                </a:lnTo>
+                <a:lnTo>
+                  <a:pt x="8071" y="17163"/>
+                </a:lnTo>
+                <a:cubicBezTo>
+                  <a:pt x="8153" y="17163"/>
+                  <a:pt x="8212" y="17254"/>
+                  <a:pt x="8212" y="17376"/>
+                </a:cubicBezTo>
+                <a:lnTo>
+                  <a:pt x="8212" y="17895"/>
+                </a:lnTo>
+                <a:cubicBezTo>
+                  <a:pt x="8212" y="18017"/>
+                  <a:pt x="8149" y="18113"/>
+                  <a:pt x="8071" y="18113"/>
+                </a:cubicBezTo>
+                <a:lnTo>
+                  <a:pt x="7749" y="18113"/>
+                </a:lnTo>
+                <a:cubicBezTo>
+                  <a:pt x="7726" y="18113"/>
+                  <a:pt x="7684" y="18100"/>
+                  <a:pt x="7663" y="18084"/>
+                </a:cubicBezTo>
+                <a:lnTo>
+                  <a:pt x="7577" y="18027"/>
+                </a:lnTo>
+                <a:cubicBezTo>
+                  <a:pt x="7529" y="17994"/>
+                  <a:pt x="7512" y="17966"/>
+                  <a:pt x="7512" y="17913"/>
+                </a:cubicBezTo>
+                <a:cubicBezTo>
+                  <a:pt x="7512" y="17855"/>
+                  <a:pt x="7544" y="17807"/>
+                  <a:pt x="7580" y="17807"/>
+                </a:cubicBezTo>
+                <a:cubicBezTo>
+                  <a:pt x="7593" y="17807"/>
+                  <a:pt x="7606" y="17809"/>
+                  <a:pt x="7619" y="17820"/>
+                </a:cubicBezTo>
+                <a:lnTo>
+                  <a:pt x="7634" y="17830"/>
+                </a:lnTo>
+                <a:lnTo>
+                  <a:pt x="7710" y="17882"/>
+                </a:lnTo>
+                <a:cubicBezTo>
+                  <a:pt x="7713" y="17885"/>
+                  <a:pt x="7718" y="17887"/>
+                  <a:pt x="7724" y="17890"/>
+                </a:cubicBezTo>
+                <a:cubicBezTo>
+                  <a:pt x="7730" y="17892"/>
+                  <a:pt x="7732" y="17895"/>
+                  <a:pt x="7734" y="17895"/>
+                </a:cubicBezTo>
+                <a:lnTo>
+                  <a:pt x="7752" y="17898"/>
+                </a:lnTo>
+                <a:lnTo>
+                  <a:pt x="7766" y="17898"/>
+                </a:lnTo>
+                <a:lnTo>
+                  <a:pt x="8071" y="17898"/>
+                </a:lnTo>
+                <a:lnTo>
+                  <a:pt x="8071" y="17379"/>
+                </a:lnTo>
+                <a:lnTo>
+                  <a:pt x="7653" y="17379"/>
+                </a:lnTo>
+                <a:lnTo>
+                  <a:pt x="7653" y="16424"/>
+                </a:lnTo>
+                <a:close/>
+                <a:moveTo>
+                  <a:pt x="19636" y="16424"/>
+                </a:moveTo>
+                <a:lnTo>
+                  <a:pt x="20100" y="16424"/>
+                </a:lnTo>
+                <a:lnTo>
+                  <a:pt x="20115" y="16424"/>
+                </a:lnTo>
+                <a:cubicBezTo>
+                  <a:pt x="20165" y="16421"/>
+                  <a:pt x="20196" y="16464"/>
+                  <a:pt x="20196" y="16530"/>
+                </a:cubicBezTo>
+                <a:cubicBezTo>
+                  <a:pt x="20196" y="16594"/>
+                  <a:pt x="20165" y="16637"/>
+                  <a:pt x="20117" y="16637"/>
+                </a:cubicBezTo>
+                <a:lnTo>
+                  <a:pt x="20102" y="16637"/>
+                </a:lnTo>
+                <a:lnTo>
+                  <a:pt x="19778" y="16637"/>
+                </a:lnTo>
+                <a:lnTo>
+                  <a:pt x="19776" y="17163"/>
+                </a:lnTo>
+                <a:lnTo>
+                  <a:pt x="20053" y="17163"/>
+                </a:lnTo>
+                <a:cubicBezTo>
+                  <a:pt x="20134" y="17163"/>
+                  <a:pt x="20195" y="17254"/>
+                  <a:pt x="20195" y="17376"/>
+                </a:cubicBezTo>
+                <a:lnTo>
+                  <a:pt x="20195" y="17895"/>
+                </a:lnTo>
+                <a:cubicBezTo>
+                  <a:pt x="20195" y="18017"/>
+                  <a:pt x="20131" y="18113"/>
+                  <a:pt x="20053" y="18113"/>
+                </a:cubicBezTo>
+                <a:lnTo>
+                  <a:pt x="19732" y="18113"/>
+                </a:lnTo>
+                <a:cubicBezTo>
+                  <a:pt x="19709" y="18113"/>
+                  <a:pt x="19667" y="18100"/>
+                  <a:pt x="19646" y="18084"/>
+                </a:cubicBezTo>
+                <a:lnTo>
+                  <a:pt x="19560" y="18027"/>
+                </a:lnTo>
+                <a:cubicBezTo>
+                  <a:pt x="19512" y="17994"/>
+                  <a:pt x="19494" y="17966"/>
+                  <a:pt x="19494" y="17913"/>
+                </a:cubicBezTo>
+                <a:cubicBezTo>
+                  <a:pt x="19494" y="17855"/>
+                  <a:pt x="19527" y="17807"/>
+                  <a:pt x="19563" y="17807"/>
+                </a:cubicBezTo>
+                <a:cubicBezTo>
+                  <a:pt x="19576" y="17807"/>
+                  <a:pt x="19587" y="17809"/>
+                  <a:pt x="19600" y="17820"/>
+                </a:cubicBezTo>
+                <a:lnTo>
+                  <a:pt x="19615" y="17830"/>
+                </a:lnTo>
+                <a:lnTo>
+                  <a:pt x="19691" y="17882"/>
+                </a:lnTo>
+                <a:cubicBezTo>
+                  <a:pt x="19695" y="17885"/>
+                  <a:pt x="19700" y="17887"/>
+                  <a:pt x="19705" y="17890"/>
+                </a:cubicBezTo>
+                <a:cubicBezTo>
+                  <a:pt x="19712" y="17892"/>
+                  <a:pt x="19715" y="17895"/>
+                  <a:pt x="19717" y="17895"/>
+                </a:cubicBezTo>
+                <a:lnTo>
+                  <a:pt x="19734" y="17898"/>
+                </a:lnTo>
+                <a:lnTo>
+                  <a:pt x="19747" y="17898"/>
+                </a:lnTo>
+                <a:lnTo>
+                  <a:pt x="20053" y="17898"/>
+                </a:lnTo>
+                <a:lnTo>
+                  <a:pt x="20053" y="17379"/>
+                </a:lnTo>
+                <a:lnTo>
+                  <a:pt x="19636" y="17379"/>
+                </a:lnTo>
+                <a:lnTo>
+                  <a:pt x="19636" y="16424"/>
+                </a:lnTo>
+                <a:close/>
+                <a:moveTo>
+                  <a:pt x="11767" y="16637"/>
+                </a:moveTo>
+                <a:lnTo>
+                  <a:pt x="11767" y="17161"/>
+                </a:lnTo>
+                <a:lnTo>
+                  <a:pt x="11905" y="17161"/>
+                </a:lnTo>
+                <a:lnTo>
+                  <a:pt x="11905" y="16637"/>
+                </a:lnTo>
+                <a:lnTo>
+                  <a:pt x="11767" y="16637"/>
+                </a:lnTo>
+                <a:close/>
+                <a:moveTo>
+                  <a:pt x="1662" y="16639"/>
+                </a:moveTo>
+                <a:lnTo>
+                  <a:pt x="1662" y="17898"/>
+                </a:lnTo>
+                <a:lnTo>
+                  <a:pt x="2082" y="17898"/>
+                </a:lnTo>
+                <a:lnTo>
+                  <a:pt x="2082" y="16639"/>
+                </a:lnTo>
+                <a:lnTo>
+                  <a:pt x="1662" y="16639"/>
+                </a:lnTo>
+                <a:close/>
+                <a:moveTo>
+                  <a:pt x="12637" y="16639"/>
+                </a:moveTo>
+                <a:lnTo>
+                  <a:pt x="12637" y="16979"/>
+                </a:lnTo>
+                <a:lnTo>
+                  <a:pt x="13054" y="16979"/>
+                </a:lnTo>
+                <a:lnTo>
+                  <a:pt x="13054" y="16639"/>
+                </a:lnTo>
+                <a:lnTo>
+                  <a:pt x="12637" y="16639"/>
+                </a:lnTo>
+                <a:close/>
+                <a:moveTo>
+                  <a:pt x="13645" y="16639"/>
+                </a:moveTo>
+                <a:lnTo>
+                  <a:pt x="13645" y="17898"/>
+                </a:lnTo>
+                <a:lnTo>
+                  <a:pt x="14064" y="17898"/>
+                </a:lnTo>
+                <a:lnTo>
+                  <a:pt x="14064" y="16639"/>
+                </a:lnTo>
+                <a:lnTo>
+                  <a:pt x="13645" y="16639"/>
+                </a:lnTo>
+                <a:close/>
+                <a:moveTo>
+                  <a:pt x="11625" y="17379"/>
+                </a:moveTo>
+                <a:lnTo>
+                  <a:pt x="11625" y="17898"/>
+                </a:lnTo>
+                <a:lnTo>
+                  <a:pt x="12046" y="17898"/>
+                </a:lnTo>
+                <a:lnTo>
+                  <a:pt x="12046" y="17379"/>
+                </a:lnTo>
+                <a:lnTo>
+                  <a:pt x="11625" y="17379"/>
+                </a:lnTo>
+                <a:close/>
+                <a:moveTo>
+                  <a:pt x="8664" y="17552"/>
+                </a:moveTo>
+                <a:lnTo>
+                  <a:pt x="8664" y="17895"/>
+                </a:lnTo>
+                <a:lnTo>
+                  <a:pt x="9083" y="17895"/>
+                </a:lnTo>
+                <a:lnTo>
+                  <a:pt x="9083" y="17552"/>
+                </a:lnTo>
+                <a:lnTo>
+                  <a:pt x="8664" y="17552"/>
+                </a:lnTo>
+                <a:close/>
+              </a:path>
+            </a:pathLst>
+          </a:custGeom>
+          <a:solidFill>
+            <a:schemeClr val="accent1">
+              <a:hueOff val="450000"/>
+              <a:satOff val="-18071"/>
+              <a:lumOff val="-14609"/>
+            </a:schemeClr>
+          </a:solidFill>
+          <a:ln w="12700">
+            <a:miter lim="400000"/>
+          </a:ln>
+          <a:extLst>
+            <a:ext uri="{C572A759-6A51-4108-AA02-DFA0A04FC94B}">
+              <ma14:wrappingTextBoxFlag xmlns:ma14="http://schemas.microsoft.com/office/mac/drawingml/2011/main" val="1"/>
+            </a:ext>
+          </a:extLst>
+        </p:spPr>
+        <p:txBody>
+          <a:bodyPr lIns="50800" tIns="50800" rIns="50800" bIns="50800" anchor="ctr"/>
+          <a:lstStyle>
+            <a:lvl1pPr>
+              <a:defRPr cap="all" spc="384" sz="2400">
+                <a:latin typeface="Avenir Medium"/>
+                <a:ea typeface="Avenir Medium"/>
+                <a:cs typeface="Avenir Medium"/>
+                <a:sym typeface="Avenir Medium"/>
+              </a:defRPr>
+            </a:lvl1pPr>
+          </a:lstStyle>
+          <a:p>
+            <a:pPr/>
+            <a:r>
+              <a:t>bookings</a:t>
+            </a:r>
+          </a:p>
+        </p:txBody>
+      </p:sp>
+    </p:spTree>
+  </p:cSld>
+  <p:clrMapOvr>
+    <a:masterClrMapping/>
+  </p:clrMapOvr>
+  <mc:AlternateContent xmlns:mc="http://schemas.openxmlformats.org/markup-compatibility/2006">
+    <mc:Choice xmlns:p14="http://schemas.microsoft.com/office/powerpoint/2010/main" Requires="p14">
+      <p:transition spd="slow" advClick="1" p14:dur="1500">
+        <p:fade thruBlk="1"/>
+      </p:transition>
+    </mc:Choice>
+    <mc:Fallback>
+      <p:transition spd="slow">
+        <p:fade/>
+      </p:transition>
+    </mc:Fallback>
+  </mc:AlternateContent>
+</p:sld>
+</file>
+
 <file path=ppt/slides/slide2.xml><?xml version="1.0" encoding="utf-8"?>
 <p:sld xmlns:a="http://schemas.openxmlformats.org/drawingml/2006/main" xmlns:r="http://schemas.openxmlformats.org/officeDocument/2006/relationships" xmlns:p="http://schemas.openxmlformats.org/presentationml/2006/main" showMasterSp="1" showMasterPhAnim="1">
   <p:cSld>
@@ -6094,9 +8575,9 @@
       </p:par>
     </p:tnLst>
     <p:bldLst>
+      <p:bldP build="whole" bldLvl="1" animBg="1" rev="0" advAuto="0" spid="172" grpId="2"/>
       <p:bldP build="whole" bldLvl="1" animBg="1" rev="0" advAuto="0" spid="171" grpId="3"/>
       <p:bldP build="whole" bldLvl="1" animBg="1" rev="0" advAuto="0" spid="173" grpId="1"/>
-      <p:bldP build="whole" bldLvl="1" animBg="1" rev="0" advAuto="0" spid="172" grpId="2"/>
     </p:bldLst>
   </p:timing>
 </p:sld>

</xml_diff>